<commit_message>
Updated PPT to fix a few minor errors
</commit_message>
<xml_diff>
--- a/Python as an additional language/Lesson 7/Session 7.pptx
+++ b/Python as an additional language/Lesson 7/Session 7.pptx
@@ -257,7 +257,7 @@
           <a:p>
             <a:fld id="{F86DE704-5A85-4041-9FC6-7273780BCBF6}" type="datetimeFigureOut">
               <a:rPr lang="en-US" smtClean="0"/>
-              <a:t>11/1/16</a:t>
+              <a:t>11/2/16</a:t>
             </a:fld>
             <a:endParaRPr lang="en-US"/>
           </a:p>
@@ -427,7 +427,7 @@
           <a:p>
             <a:fld id="{F86DE704-5A85-4041-9FC6-7273780BCBF6}" type="datetimeFigureOut">
               <a:rPr lang="en-US" smtClean="0"/>
-              <a:t>11/1/16</a:t>
+              <a:t>11/2/16</a:t>
             </a:fld>
             <a:endParaRPr lang="en-US"/>
           </a:p>
@@ -607,7 +607,7 @@
           <a:p>
             <a:fld id="{F86DE704-5A85-4041-9FC6-7273780BCBF6}" type="datetimeFigureOut">
               <a:rPr lang="en-US" smtClean="0"/>
-              <a:t>11/1/16</a:t>
+              <a:t>11/2/16</a:t>
             </a:fld>
             <a:endParaRPr lang="en-US"/>
           </a:p>
@@ -777,7 +777,7 @@
           <a:p>
             <a:fld id="{F86DE704-5A85-4041-9FC6-7273780BCBF6}" type="datetimeFigureOut">
               <a:rPr lang="en-US" smtClean="0"/>
-              <a:t>11/1/16</a:t>
+              <a:t>11/2/16</a:t>
             </a:fld>
             <a:endParaRPr lang="en-US"/>
           </a:p>
@@ -1023,7 +1023,7 @@
           <a:p>
             <a:fld id="{F86DE704-5A85-4041-9FC6-7273780BCBF6}" type="datetimeFigureOut">
               <a:rPr lang="en-US" smtClean="0"/>
-              <a:t>11/1/16</a:t>
+              <a:t>11/2/16</a:t>
             </a:fld>
             <a:endParaRPr lang="en-US"/>
           </a:p>
@@ -1255,7 +1255,7 @@
           <a:p>
             <a:fld id="{F86DE704-5A85-4041-9FC6-7273780BCBF6}" type="datetimeFigureOut">
               <a:rPr lang="en-US" smtClean="0"/>
-              <a:t>11/1/16</a:t>
+              <a:t>11/2/16</a:t>
             </a:fld>
             <a:endParaRPr lang="en-US"/>
           </a:p>
@@ -1622,7 +1622,7 @@
           <a:p>
             <a:fld id="{F86DE704-5A85-4041-9FC6-7273780BCBF6}" type="datetimeFigureOut">
               <a:rPr lang="en-US" smtClean="0"/>
-              <a:t>11/1/16</a:t>
+              <a:t>11/2/16</a:t>
             </a:fld>
             <a:endParaRPr lang="en-US"/>
           </a:p>
@@ -1740,7 +1740,7 @@
           <a:p>
             <a:fld id="{F86DE704-5A85-4041-9FC6-7273780BCBF6}" type="datetimeFigureOut">
               <a:rPr lang="en-US" smtClean="0"/>
-              <a:t>11/1/16</a:t>
+              <a:t>11/2/16</a:t>
             </a:fld>
             <a:endParaRPr lang="en-US"/>
           </a:p>
@@ -1835,7 +1835,7 @@
           <a:p>
             <a:fld id="{F86DE704-5A85-4041-9FC6-7273780BCBF6}" type="datetimeFigureOut">
               <a:rPr lang="en-US" smtClean="0"/>
-              <a:t>11/1/16</a:t>
+              <a:t>11/2/16</a:t>
             </a:fld>
             <a:endParaRPr lang="en-US"/>
           </a:p>
@@ -2112,7 +2112,7 @@
           <a:p>
             <a:fld id="{F86DE704-5A85-4041-9FC6-7273780BCBF6}" type="datetimeFigureOut">
               <a:rPr lang="en-US" smtClean="0"/>
-              <a:t>11/1/16</a:t>
+              <a:t>11/2/16</a:t>
             </a:fld>
             <a:endParaRPr lang="en-US"/>
           </a:p>
@@ -2365,7 +2365,7 @@
           <a:p>
             <a:fld id="{F86DE704-5A85-4041-9FC6-7273780BCBF6}" type="datetimeFigureOut">
               <a:rPr lang="en-US" smtClean="0"/>
-              <a:t>11/1/16</a:t>
+              <a:t>11/2/16</a:t>
             </a:fld>
             <a:endParaRPr lang="en-US"/>
           </a:p>
@@ -2578,7 +2578,7 @@
           <a:p>
             <a:fld id="{F86DE704-5A85-4041-9FC6-7273780BCBF6}" type="datetimeFigureOut">
               <a:rPr lang="en-US" smtClean="0"/>
-              <a:t>11/1/16</a:t>
+              <a:t>11/2/16</a:t>
             </a:fld>
             <a:endParaRPr lang="en-US"/>
           </a:p>
@@ -3096,6 +3096,13 @@
   <p:clrMapOvr>
     <a:masterClrMapping/>
   </p:clrMapOvr>
+  <p:timing>
+    <p:tnLst>
+      <p:par>
+        <p:cTn id="1" dur="indefinite" restart="never" nodeType="tmRoot"/>
+      </p:par>
+    </p:tnLst>
+  </p:timing>
 </p:sld>
 </file>
 
@@ -3180,6 +3187,13 @@
   <p:clrMapOvr>
     <a:masterClrMapping/>
   </p:clrMapOvr>
+  <p:timing>
+    <p:tnLst>
+      <p:par>
+        <p:cTn id="1" dur="indefinite" restart="never" nodeType="tmRoot"/>
+      </p:par>
+    </p:tnLst>
+  </p:timing>
 </p:sld>
 </file>
 
@@ -3293,6 +3307,13 @@
   <p:clrMapOvr>
     <a:masterClrMapping/>
   </p:clrMapOvr>
+  <p:timing>
+    <p:tnLst>
+      <p:par>
+        <p:cTn id="1" dur="indefinite" restart="never" nodeType="tmRoot"/>
+      </p:par>
+    </p:tnLst>
+  </p:timing>
 </p:sld>
 </file>
 
@@ -3456,6 +3477,13 @@
   <p:clrMapOvr>
     <a:masterClrMapping/>
   </p:clrMapOvr>
+  <p:timing>
+    <p:tnLst>
+      <p:par>
+        <p:cTn id="1" dur="indefinite" restart="never" nodeType="tmRoot"/>
+      </p:par>
+    </p:tnLst>
+  </p:timing>
 </p:sld>
 </file>
 
@@ -3502,7 +3530,7 @@
       </p:sp>
       <p:pic>
         <p:nvPicPr>
-          <p:cNvPr id="6" name="Content Placeholder 5"/>
+          <p:cNvPr id="9" name="Content Placeholder 8"/>
           <p:cNvPicPr>
             <a:picLocks noGrp="1" noChangeAspect="1"/>
           </p:cNvPicPr>
@@ -3524,8 +3552,8 @@
         </p:blipFill>
         <p:spPr>
           <a:xfrm>
-            <a:off x="1358860" y="1825625"/>
-            <a:ext cx="9474279" cy="4351338"/>
+            <a:off x="1435100" y="2197894"/>
+            <a:ext cx="9321800" cy="3606800"/>
           </a:xfrm>
         </p:spPr>
       </p:pic>
@@ -3569,6 +3597,13 @@
   <p:clrMapOvr>
     <a:masterClrMapping/>
   </p:clrMapOvr>
+  <p:timing>
+    <p:tnLst>
+      <p:par>
+        <p:cTn id="1" dur="indefinite" restart="never" nodeType="tmRoot"/>
+      </p:par>
+    </p:tnLst>
+  </p:timing>
 </p:sld>
 </file>
 
@@ -3615,35 +3650,6 @@
       </p:sp>
       <p:pic>
         <p:nvPicPr>
-          <p:cNvPr id="4" name="Content Placeholder 3"/>
-          <p:cNvPicPr>
-            <a:picLocks noGrp="1" noChangeAspect="1"/>
-          </p:cNvPicPr>
-          <p:nvPr>
-            <p:ph idx="1"/>
-          </p:nvPr>
-        </p:nvPicPr>
-        <p:blipFill>
-          <a:blip r:embed="rId2">
-            <a:extLst>
-              <a:ext uri="{28A0092B-C50C-407E-A947-70E740481C1C}">
-                <a14:useLocalDpi xmlns:a14="http://schemas.microsoft.com/office/drawing/2010/main" val="0"/>
-              </a:ext>
-            </a:extLst>
-          </a:blip>
-          <a:stretch>
-            <a:fillRect/>
-          </a:stretch>
-        </p:blipFill>
-        <p:spPr>
-          <a:xfrm>
-            <a:off x="1828800" y="2750344"/>
-            <a:ext cx="8534400" cy="2501900"/>
-          </a:xfrm>
-        </p:spPr>
-      </p:pic>
-      <p:pic>
-        <p:nvPicPr>
           <p:cNvPr id="5" name="Picture 4"/>
           <p:cNvPicPr>
             <a:picLocks noChangeAspect="1"/>
@@ -3651,7 +3657,7 @@
           <p:nvPr/>
         </p:nvPicPr>
         <p:blipFill>
-          <a:blip r:embed="rId3">
+          <a:blip r:embed="rId2">
             <a:extLst>
               <a:ext uri="{28A0092B-C50C-407E-A947-70E740481C1C}">
                 <a14:useLocalDpi xmlns:a14="http://schemas.microsoft.com/office/drawing/2010/main" val="0"/>
@@ -3672,6 +3678,35 @@
           </a:prstGeom>
         </p:spPr>
       </p:pic>
+      <p:pic>
+        <p:nvPicPr>
+          <p:cNvPr id="6" name="Content Placeholder 5"/>
+          <p:cNvPicPr>
+            <a:picLocks noGrp="1" noChangeAspect="1"/>
+          </p:cNvPicPr>
+          <p:nvPr>
+            <p:ph idx="1"/>
+          </p:nvPr>
+        </p:nvPicPr>
+        <p:blipFill>
+          <a:blip r:embed="rId3">
+            <a:extLst>
+              <a:ext uri="{28A0092B-C50C-407E-A947-70E740481C1C}">
+                <a14:useLocalDpi xmlns:a14="http://schemas.microsoft.com/office/drawing/2010/main" val="0"/>
+              </a:ext>
+            </a:extLst>
+          </a:blip>
+          <a:stretch>
+            <a:fillRect/>
+          </a:stretch>
+        </p:blipFill>
+        <p:spPr>
+          <a:xfrm>
+            <a:off x="2660650" y="2173381"/>
+            <a:ext cx="6870700" cy="1968500"/>
+          </a:xfrm>
+        </p:spPr>
+      </p:pic>
     </p:spTree>
     <p:extLst>
       <p:ext uri="{BB962C8B-B14F-4D97-AF65-F5344CB8AC3E}">
@@ -3682,6 +3717,13 @@
   <p:clrMapOvr>
     <a:masterClrMapping/>
   </p:clrMapOvr>
+  <p:timing>
+    <p:tnLst>
+      <p:par>
+        <p:cTn id="1" dur="indefinite" restart="never" nodeType="tmRoot"/>
+      </p:par>
+    </p:tnLst>
+  </p:timing>
 </p:sld>
 </file>
 
@@ -3720,7 +3762,11 @@
             <a:pPr algn="ctr"/>
             <a:r>
               <a:rPr lang="en-US" dirty="0" smtClean="0"/>
-              <a:t>Extra Credit / Homework</a:t>
+              <a:t>Bonus Points/ </a:t>
+            </a:r>
+            <a:r>
+              <a:rPr lang="en-US" dirty="0" smtClean="0"/>
+              <a:t>Homework</a:t>
             </a:r>
             <a:endParaRPr lang="en-US" dirty="0"/>
           </a:p>
@@ -3832,6 +3878,13 @@
   <p:clrMapOvr>
     <a:masterClrMapping/>
   </p:clrMapOvr>
+  <p:timing>
+    <p:tnLst>
+      <p:par>
+        <p:cTn id="1" dur="indefinite" restart="never" nodeType="tmRoot"/>
+      </p:par>
+    </p:tnLst>
+  </p:timing>
 </p:sld>
 </file>
 
@@ -3946,6 +3999,13 @@
   <p:clrMapOvr>
     <a:masterClrMapping/>
   </p:clrMapOvr>
+  <p:timing>
+    <p:tnLst>
+      <p:par>
+        <p:cTn id="1" dur="indefinite" restart="never" nodeType="tmRoot"/>
+      </p:par>
+    </p:tnLst>
+  </p:timing>
 </p:sld>
 </file>
 
@@ -4109,6 +4169,13 @@
   <p:clrMapOvr>
     <a:masterClrMapping/>
   </p:clrMapOvr>
+  <p:timing>
+    <p:tnLst>
+      <p:par>
+        <p:cTn id="1" dur="indefinite" restart="never" nodeType="tmRoot"/>
+      </p:par>
+    </p:tnLst>
+  </p:timing>
 </p:sld>
 </file>
 
@@ -4281,6 +4348,13 @@
   <p:clrMapOvr>
     <a:masterClrMapping/>
   </p:clrMapOvr>
+  <p:timing>
+    <p:tnLst>
+      <p:par>
+        <p:cTn id="1" dur="indefinite" restart="never" nodeType="tmRoot"/>
+      </p:par>
+    </p:tnLst>
+  </p:timing>
 </p:sld>
 </file>
 
@@ -4355,15 +4429,7 @@
             <a:pPr lvl="1"/>
             <a:r>
               <a:rPr lang="en-US" dirty="0" smtClean="0"/>
-              <a:t>Program B needs </a:t>
-            </a:r>
-            <a:r>
-              <a:rPr lang="en-US" dirty="0" smtClean="0"/>
-              <a:t>(incompatible) version </a:t>
-            </a:r>
-            <a:r>
-              <a:rPr lang="en-US" dirty="0" smtClean="0"/>
-              <a:t>2 of the same module </a:t>
+              <a:t>Program B needs (incompatible) version 2 of the same module </a:t>
             </a:r>
           </a:p>
           <a:p>
@@ -4475,6 +4541,13 @@
   <p:clrMapOvr>
     <a:masterClrMapping/>
   </p:clrMapOvr>
+  <p:timing>
+    <p:tnLst>
+      <p:par>
+        <p:cTn id="1" dur="indefinite" restart="never" nodeType="tmRoot"/>
+      </p:par>
+    </p:tnLst>
+  </p:timing>
 </p:sld>
 </file>
 
@@ -4917,6 +4990,13 @@
   <p:clrMapOvr>
     <a:masterClrMapping/>
   </p:clrMapOvr>
+  <p:timing>
+    <p:tnLst>
+      <p:par>
+        <p:cTn id="1" dur="indefinite" restart="never" nodeType="tmRoot"/>
+      </p:par>
+    </p:tnLst>
+  </p:timing>
 </p:sld>
 </file>
 
@@ -4963,7 +5043,7 @@
       </p:sp>
       <p:pic>
         <p:nvPicPr>
-          <p:cNvPr id="12" name="Picture 11"/>
+          <p:cNvPr id="3" name="Picture 2"/>
           <p:cNvPicPr>
             <a:picLocks noChangeAspect="1"/>
           </p:cNvPicPr>
@@ -4983,8 +5063,8 @@
         </p:blipFill>
         <p:spPr>
           <a:xfrm>
-            <a:off x="400050" y="1690688"/>
-            <a:ext cx="11391900" cy="3937000"/>
+            <a:off x="838200" y="1371600"/>
+            <a:ext cx="10502900" cy="4102100"/>
           </a:xfrm>
           <a:prstGeom prst="rect">
             <a:avLst/>
@@ -5031,6 +5111,13 @@
   <p:clrMapOvr>
     <a:masterClrMapping/>
   </p:clrMapOvr>
+  <p:timing>
+    <p:tnLst>
+      <p:par>
+        <p:cTn id="1" dur="indefinite" restart="never" nodeType="tmRoot"/>
+      </p:par>
+    </p:tnLst>
+  </p:timing>
 </p:sld>
 </file>
 

</xml_diff>

<commit_message>
Fix a bug in one of the examples
</commit_message>
<xml_diff>
--- a/Python as an additional language/Lesson 7/Session 7.pptx
+++ b/Python as an additional language/Lesson 7/Session 7.pptx
@@ -257,7 +257,7 @@
           <a:p>
             <a:fld id="{F86DE704-5A85-4041-9FC6-7273780BCBF6}" type="datetimeFigureOut">
               <a:rPr lang="en-US" smtClean="0"/>
-              <a:t>11/2/16</a:t>
+              <a:t>3/15/17</a:t>
             </a:fld>
             <a:endParaRPr lang="en-US"/>
           </a:p>
@@ -427,7 +427,7 @@
           <a:p>
             <a:fld id="{F86DE704-5A85-4041-9FC6-7273780BCBF6}" type="datetimeFigureOut">
               <a:rPr lang="en-US" smtClean="0"/>
-              <a:t>11/2/16</a:t>
+              <a:t>3/15/17</a:t>
             </a:fld>
             <a:endParaRPr lang="en-US"/>
           </a:p>
@@ -607,7 +607,7 @@
           <a:p>
             <a:fld id="{F86DE704-5A85-4041-9FC6-7273780BCBF6}" type="datetimeFigureOut">
               <a:rPr lang="en-US" smtClean="0"/>
-              <a:t>11/2/16</a:t>
+              <a:t>3/15/17</a:t>
             </a:fld>
             <a:endParaRPr lang="en-US"/>
           </a:p>
@@ -777,7 +777,7 @@
           <a:p>
             <a:fld id="{F86DE704-5A85-4041-9FC6-7273780BCBF6}" type="datetimeFigureOut">
               <a:rPr lang="en-US" smtClean="0"/>
-              <a:t>11/2/16</a:t>
+              <a:t>3/15/17</a:t>
             </a:fld>
             <a:endParaRPr lang="en-US"/>
           </a:p>
@@ -1023,7 +1023,7 @@
           <a:p>
             <a:fld id="{F86DE704-5A85-4041-9FC6-7273780BCBF6}" type="datetimeFigureOut">
               <a:rPr lang="en-US" smtClean="0"/>
-              <a:t>11/2/16</a:t>
+              <a:t>3/15/17</a:t>
             </a:fld>
             <a:endParaRPr lang="en-US"/>
           </a:p>
@@ -1255,7 +1255,7 @@
           <a:p>
             <a:fld id="{F86DE704-5A85-4041-9FC6-7273780BCBF6}" type="datetimeFigureOut">
               <a:rPr lang="en-US" smtClean="0"/>
-              <a:t>11/2/16</a:t>
+              <a:t>3/15/17</a:t>
             </a:fld>
             <a:endParaRPr lang="en-US"/>
           </a:p>
@@ -1622,7 +1622,7 @@
           <a:p>
             <a:fld id="{F86DE704-5A85-4041-9FC6-7273780BCBF6}" type="datetimeFigureOut">
               <a:rPr lang="en-US" smtClean="0"/>
-              <a:t>11/2/16</a:t>
+              <a:t>3/15/17</a:t>
             </a:fld>
             <a:endParaRPr lang="en-US"/>
           </a:p>
@@ -1740,7 +1740,7 @@
           <a:p>
             <a:fld id="{F86DE704-5A85-4041-9FC6-7273780BCBF6}" type="datetimeFigureOut">
               <a:rPr lang="en-US" smtClean="0"/>
-              <a:t>11/2/16</a:t>
+              <a:t>3/15/17</a:t>
             </a:fld>
             <a:endParaRPr lang="en-US"/>
           </a:p>
@@ -1835,7 +1835,7 @@
           <a:p>
             <a:fld id="{F86DE704-5A85-4041-9FC6-7273780BCBF6}" type="datetimeFigureOut">
               <a:rPr lang="en-US" smtClean="0"/>
-              <a:t>11/2/16</a:t>
+              <a:t>3/15/17</a:t>
             </a:fld>
             <a:endParaRPr lang="en-US"/>
           </a:p>
@@ -2112,7 +2112,7 @@
           <a:p>
             <a:fld id="{F86DE704-5A85-4041-9FC6-7273780BCBF6}" type="datetimeFigureOut">
               <a:rPr lang="en-US" smtClean="0"/>
-              <a:t>11/2/16</a:t>
+              <a:t>3/15/17</a:t>
             </a:fld>
             <a:endParaRPr lang="en-US"/>
           </a:p>
@@ -2365,7 +2365,7 @@
           <a:p>
             <a:fld id="{F86DE704-5A85-4041-9FC6-7273780BCBF6}" type="datetimeFigureOut">
               <a:rPr lang="en-US" smtClean="0"/>
-              <a:t>11/2/16</a:t>
+              <a:t>3/15/17</a:t>
             </a:fld>
             <a:endParaRPr lang="en-US"/>
           </a:p>
@@ -2578,7 +2578,7 @@
           <a:p>
             <a:fld id="{F86DE704-5A85-4041-9FC6-7273780BCBF6}" type="datetimeFigureOut">
               <a:rPr lang="en-US" smtClean="0"/>
-              <a:t>11/2/16</a:t>
+              <a:t>3/15/17</a:t>
             </a:fld>
             <a:endParaRPr lang="en-US"/>
           </a:p>
@@ -3262,7 +3262,7 @@
         </p:blipFill>
         <p:spPr>
           <a:xfrm>
-            <a:off x="1508817" y="1825625"/>
+            <a:off x="1508817" y="1690688"/>
             <a:ext cx="9174365" cy="4351338"/>
           </a:xfrm>
         </p:spPr>
@@ -3530,7 +3530,7 @@
       </p:sp>
       <p:pic>
         <p:nvPicPr>
-          <p:cNvPr id="9" name="Content Placeholder 8"/>
+          <p:cNvPr id="4" name="Content Placeholder 3"/>
           <p:cNvPicPr>
             <a:picLocks noGrp="1" noChangeAspect="1"/>
           </p:cNvPicPr>
@@ -3552,8 +3552,8 @@
         </p:blipFill>
         <p:spPr>
           <a:xfrm>
-            <a:off x="1435100" y="2197894"/>
-            <a:ext cx="9321800" cy="3606800"/>
+            <a:off x="838200" y="1974574"/>
+            <a:ext cx="10515600" cy="4053440"/>
           </a:xfrm>
         </p:spPr>
       </p:pic>
@@ -3762,11 +3762,7 @@
             <a:pPr algn="ctr"/>
             <a:r>
               <a:rPr lang="en-US" dirty="0" smtClean="0"/>
-              <a:t>Bonus Points/ </a:t>
-            </a:r>
-            <a:r>
-              <a:rPr lang="en-US" dirty="0" smtClean="0"/>
-              <a:t>Homework</a:t>
+              <a:t>Bonus Points/ Homework</a:t>
             </a:r>
             <a:endParaRPr lang="en-US" dirty="0"/>
           </a:p>
@@ -3951,7 +3947,7 @@
         </p:blipFill>
         <p:spPr>
           <a:xfrm>
-            <a:off x="1304056" y="1690688"/>
+            <a:off x="1304056" y="1413597"/>
             <a:ext cx="9583888" cy="4169785"/>
           </a:xfrm>
           <a:prstGeom prst="rect">
@@ -3989,6 +3985,52 @@
           </a:prstGeom>
         </p:spPr>
       </p:pic>
+      <p:sp>
+        <p:nvSpPr>
+          <p:cNvPr id="3" name="TextBox 2"/>
+          <p:cNvSpPr txBox="1"/>
+          <p:nvPr/>
+        </p:nvSpPr>
+        <p:spPr>
+          <a:xfrm>
+            <a:off x="2469430" y="5946130"/>
+            <a:ext cx="7253139" cy="461665"/>
+          </a:xfrm>
+          <a:prstGeom prst="rect">
+            <a:avLst/>
+          </a:prstGeom>
+          <a:noFill/>
+        </p:spPr>
+        <p:txBody>
+          <a:bodyPr wrap="none" rtlCol="0">
+            <a:spAutoFit/>
+          </a:bodyPr>
+          <a:lstStyle/>
+          <a:p>
+            <a:r>
+              <a:rPr lang="en-US" sz="2400" dirty="0"/>
+              <a:t>My solution to last week’s exercise: </a:t>
+            </a:r>
+            <a:r>
+              <a:rPr lang="en-US" sz="2400" dirty="0">
+                <a:hlinkClick r:id="rId4"/>
+              </a:rPr>
+              <a:t>http://</a:t>
+            </a:r>
+            <a:r>
+              <a:rPr lang="en-US" sz="2400" dirty="0" smtClean="0">
+                <a:hlinkClick r:id="rId4"/>
+              </a:rPr>
+              <a:t>go/qu3w5e7s</a:t>
+            </a:r>
+            <a:r>
+              <a:rPr lang="en-US" sz="2400" dirty="0" smtClean="0"/>
+              <a:t> </a:t>
+            </a:r>
+            <a:endParaRPr lang="en-US" sz="2400" dirty="0"/>
+          </a:p>
+        </p:txBody>
+      </p:sp>
     </p:spTree>
     <p:extLst>
       <p:ext uri="{BB962C8B-B14F-4D97-AF65-F5344CB8AC3E}">
@@ -4604,7 +4646,9 @@
         </p:nvSpPr>
         <p:spPr/>
         <p:txBody>
-          <a:bodyPr/>
+          <a:bodyPr>
+            <a:normAutofit fontScale="85000" lnSpcReduction="20000"/>
+          </a:bodyPr>
           <a:lstStyle/>
           <a:p>
             <a:r>
@@ -4615,26 +4659,46 @@
           <a:p>
             <a:pPr lvl="1"/>
             <a:r>
-              <a:rPr lang="en-US" dirty="0" err="1"/>
-              <a:t>v</a:t>
-            </a:r>
-            <a:r>
-              <a:rPr lang="en-US" dirty="0" err="1" smtClean="0"/>
-              <a:t>irtualenv</a:t>
-            </a:r>
-            <a:r>
-              <a:rPr lang="en-US" dirty="0" smtClean="0"/>
-              <a:t>  lesson7</a:t>
+              <a:rPr lang="en-US" dirty="0" err="1" smtClean="0">
+                <a:latin typeface="Consolas" charset="0"/>
+                <a:ea typeface="Consolas" charset="0"/>
+                <a:cs typeface="Consolas" charset="0"/>
+              </a:rPr>
+              <a:t>virtualenv</a:t>
+            </a:r>
+            <a:r>
+              <a:rPr lang="en-US" dirty="0" smtClean="0">
+                <a:latin typeface="Consolas" charset="0"/>
+                <a:ea typeface="Consolas" charset="0"/>
+                <a:cs typeface="Consolas" charset="0"/>
+              </a:rPr>
+              <a:t> </a:t>
+            </a:r>
+            <a:r>
+              <a:rPr lang="en-US" dirty="0" smtClean="0">
+                <a:latin typeface="Consolas" charset="0"/>
+                <a:ea typeface="Consolas" charset="0"/>
+                <a:cs typeface="Consolas" charset="0"/>
+              </a:rPr>
+              <a:t>lesson7</a:t>
             </a:r>
           </a:p>
           <a:p>
             <a:pPr lvl="1"/>
             <a:r>
-              <a:rPr lang="en-US" dirty="0"/>
+              <a:rPr lang="en-US" dirty="0">
+                <a:latin typeface="Consolas" charset="0"/>
+                <a:ea typeface="Consolas" charset="0"/>
+                <a:cs typeface="Consolas" charset="0"/>
+              </a:rPr>
               <a:t>s</a:t>
             </a:r>
             <a:r>
-              <a:rPr lang="en-US" dirty="0" smtClean="0"/>
+              <a:rPr lang="en-US" dirty="0" smtClean="0">
+                <a:latin typeface="Consolas" charset="0"/>
+                <a:ea typeface="Consolas" charset="0"/>
+                <a:cs typeface="Consolas" charset="0"/>
+              </a:rPr>
               <a:t>ource lesson7/bin/activate</a:t>
             </a:r>
           </a:p>
@@ -4651,19 +4715,30 @@
           <a:p>
             <a:pPr lvl="1"/>
             <a:r>
-              <a:rPr lang="en-US" dirty="0" err="1" smtClean="0"/>
+              <a:rPr lang="en-US" dirty="0" err="1" smtClean="0">
+                <a:latin typeface="Consolas" charset="0"/>
+                <a:ea typeface="Consolas" charset="0"/>
+                <a:cs typeface="Consolas" charset="0"/>
+              </a:rPr>
               <a:t>virtualenv</a:t>
             </a:r>
             <a:r>
-              <a:rPr lang="en-US" smtClean="0"/>
+              <a:rPr lang="en-US" dirty="0" smtClean="0">
+                <a:latin typeface="Consolas" charset="0"/>
+                <a:ea typeface="Consolas" charset="0"/>
+                <a:cs typeface="Consolas" charset="0"/>
+              </a:rPr>
               <a:t> lesson7</a:t>
             </a:r>
-            <a:endParaRPr lang="en-US" dirty="0" smtClean="0"/>
           </a:p>
           <a:p>
             <a:pPr lvl="1"/>
             <a:r>
-              <a:rPr lang="en-US" dirty="0" smtClean="0"/>
+              <a:rPr lang="en-US" dirty="0" smtClean="0">
+                <a:latin typeface="Consolas" charset="0"/>
+                <a:ea typeface="Consolas" charset="0"/>
+                <a:cs typeface="Consolas" charset="0"/>
+              </a:rPr>
               <a:t>lesson7\Scripts\activate</a:t>
             </a:r>
           </a:p>
@@ -4674,15 +4749,43 @@
           <a:p>
             <a:r>
               <a:rPr lang="en-US" dirty="0" smtClean="0"/>
-              <a:t>Your prompt will change  to reflect you’ve started your</a:t>
-            </a:r>
-            <a:br>
+              <a:t>Your prompt will change  to reflect you’ve started </a:t>
+            </a:r>
+            <a:r>
               <a:rPr lang="en-US" dirty="0" smtClean="0"/>
-            </a:br>
+              <a:t>your virtual environment</a:t>
+            </a:r>
+          </a:p>
+          <a:p>
+            <a:endParaRPr lang="en-US" dirty="0"/>
+          </a:p>
+          <a:p>
+            <a:r>
+              <a:rPr lang="en-US" dirty="0" err="1" smtClean="0"/>
+              <a:t>PyCharm</a:t>
+            </a:r>
             <a:r>
               <a:rPr lang="en-US" dirty="0" smtClean="0"/>
-              <a:t>virtual environment</a:t>
-            </a:r>
+              <a:t> user? I’ll show you. </a:t>
+            </a:r>
+          </a:p>
+          <a:p>
+            <a:endParaRPr lang="en-US" dirty="0" smtClean="0"/>
+          </a:p>
+          <a:p>
+            <a:r>
+              <a:rPr lang="en-US" dirty="0" smtClean="0"/>
+              <a:t>Other IDEs, you’re on your own </a:t>
+            </a:r>
+            <a:r>
+              <a:rPr lang="mr-IN" dirty="0" smtClean="0"/>
+              <a:t>–</a:t>
+            </a:r>
+            <a:r>
+              <a:rPr lang="en-US" dirty="0" smtClean="0"/>
+              <a:t> sorry!</a:t>
+            </a:r>
+            <a:endParaRPr lang="en-US" dirty="0" smtClean="0"/>
           </a:p>
           <a:p>
             <a:pPr lvl="1"/>
@@ -4945,7 +5048,7 @@
         </p:blipFill>
         <p:spPr>
           <a:xfrm>
-            <a:off x="2339686" y="1825625"/>
+            <a:off x="2339686" y="1409989"/>
             <a:ext cx="7512628" cy="4351338"/>
           </a:xfrm>
         </p:spPr>
@@ -5043,7 +5146,7 @@
       </p:sp>
       <p:pic>
         <p:nvPicPr>
-          <p:cNvPr id="3" name="Picture 2"/>
+          <p:cNvPr id="4" name="Picture 3"/>
           <p:cNvPicPr>
             <a:picLocks noChangeAspect="1"/>
           </p:cNvPicPr>
@@ -5063,8 +5166,8 @@
         </p:blipFill>
         <p:spPr>
           <a:xfrm>
-            <a:off x="838200" y="1371600"/>
-            <a:ext cx="10502900" cy="4102100"/>
+            <a:off x="522447" y="1690688"/>
+            <a:ext cx="11147106" cy="3810542"/>
           </a:xfrm>
           <a:prstGeom prst="rect">
             <a:avLst/>
@@ -5101,6 +5204,36 @@
           </a:prstGeom>
         </p:spPr>
       </p:pic>
+      <p:sp>
+        <p:nvSpPr>
+          <p:cNvPr id="6" name="TextBox 5"/>
+          <p:cNvSpPr txBox="1"/>
+          <p:nvPr/>
+        </p:nvSpPr>
+        <p:spPr>
+          <a:xfrm>
+            <a:off x="2101124" y="5946130"/>
+            <a:ext cx="7989751" cy="461665"/>
+          </a:xfrm>
+          <a:prstGeom prst="rect">
+            <a:avLst/>
+          </a:prstGeom>
+          <a:noFill/>
+        </p:spPr>
+        <p:txBody>
+          <a:bodyPr wrap="none" rtlCol="0">
+            <a:spAutoFit/>
+          </a:bodyPr>
+          <a:lstStyle/>
+          <a:p>
+            <a:r>
+              <a:rPr lang="en-US" sz="2400" dirty="0" smtClean="0"/>
+              <a:t>You can visit your nascent webserver at http://127.0.0.1:8080/</a:t>
+            </a:r>
+            <a:endParaRPr lang="en-US" sz="2400" dirty="0"/>
+          </a:p>
+        </p:txBody>
+      </p:sp>
     </p:spTree>
     <p:extLst>
       <p:ext uri="{BB962C8B-B14F-4D97-AF65-F5344CB8AC3E}">

</xml_diff>